<commit_message>
2 extra to ranvar-independence
</commit_message>
<xml_diff>
--- a/spring13/slides13/ranvar-independence.pptx
+++ b/spring13/slides13/ranvar-independence.pptx
@@ -5,10 +5,10 @@
     <p:sldMasterId id="2147483648" r:id="rId1"/>
   </p:sldMasterIdLst>
   <p:notesMasterIdLst>
-    <p:notesMasterId r:id="rId12"/>
+    <p:notesMasterId r:id="rId15"/>
   </p:notesMasterIdLst>
   <p:handoutMasterIdLst>
-    <p:handoutMasterId r:id="rId13"/>
+    <p:handoutMasterId r:id="rId16"/>
   </p:handoutMasterIdLst>
   <p:sldIdLst>
     <p:sldId id="257" r:id="rId2"/>
@@ -21,6 +21,9 @@
     <p:sldId id="293" r:id="rId9"/>
     <p:sldId id="290" r:id="rId10"/>
     <p:sldId id="360" r:id="rId11"/>
+    <p:sldId id="362" r:id="rId12"/>
+    <p:sldId id="361" r:id="rId13"/>
+    <p:sldId id="363" r:id="rId14"/>
   </p:sldIdLst>
   <p:sldSz cx="9144000" cy="6858000" type="screen4x3"/>
   <p:notesSz cx="9601200" cy="7315200"/>
@@ -1098,6 +1101,98 @@
 </p:notes>
 </file>
 
+<file path=ppt/notesSlides/notesSlide11.xml><?xml version="1.0" encoding="utf-8"?>
+<p:notes xmlns:a="http://schemas.openxmlformats.org/drawingml/2006/main" xmlns:r="http://schemas.openxmlformats.org/officeDocument/2006/relationships" xmlns:p="http://schemas.openxmlformats.org/presentationml/2006/main">
+  <p:cSld>
+    <p:spTree>
+      <p:nvGrpSpPr>
+        <p:cNvPr id="1" name=""/>
+        <p:cNvGrpSpPr/>
+        <p:nvPr/>
+      </p:nvGrpSpPr>
+      <p:grpSpPr>
+        <a:xfrm>
+          <a:off x="0" y="0"/>
+          <a:ext cx="0" cy="0"/>
+          <a:chOff x="0" y="0"/>
+          <a:chExt cx="0" cy="0"/>
+        </a:xfrm>
+      </p:grpSpPr>
+      <p:sp>
+        <p:nvSpPr>
+          <p:cNvPr id="62466" name="Rectangle 7"/>
+          <p:cNvSpPr>
+            <a:spLocks noGrp="1" noChangeArrowheads="1"/>
+          </p:cNvSpPr>
+          <p:nvPr>
+            <p:ph type="sldNum" sz="quarter" idx="5"/>
+          </p:nvPr>
+        </p:nvSpPr>
+        <p:spPr>
+          <a:noFill/>
+        </p:spPr>
+        <p:txBody>
+          <a:bodyPr/>
+          <a:lstStyle/>
+          <a:p>
+            <a:fld id="{3F25F964-877D-4E0C-8F3A-875E866A06BA}" type="slidenum">
+              <a:rPr lang="en-US" smtClean="0"/>
+              <a:pPr/>
+              <a:t>11</a:t>
+            </a:fld>
+            <a:endParaRPr lang="en-US" smtClean="0"/>
+          </a:p>
+        </p:txBody>
+      </p:sp>
+      <p:sp>
+        <p:nvSpPr>
+          <p:cNvPr id="62467" name="Rectangle 2"/>
+          <p:cNvSpPr>
+            <a:spLocks noGrp="1" noRot="1" noChangeAspect="1" noChangeArrowheads="1" noTextEdit="1"/>
+          </p:cNvSpPr>
+          <p:nvPr>
+            <p:ph type="sldImg"/>
+          </p:nvPr>
+        </p:nvSpPr>
+        <p:spPr>
+          <a:xfrm>
+            <a:off x="2973388" y="549275"/>
+            <a:ext cx="3659187" cy="2743200"/>
+          </a:xfrm>
+          <a:ln/>
+        </p:spPr>
+      </p:sp>
+      <p:sp>
+        <p:nvSpPr>
+          <p:cNvPr id="62468" name="Rectangle 3"/>
+          <p:cNvSpPr>
+            <a:spLocks noGrp="1" noChangeArrowheads="1"/>
+          </p:cNvSpPr>
+          <p:nvPr>
+            <p:ph type="body" idx="1"/>
+          </p:nvPr>
+        </p:nvSpPr>
+        <p:spPr>
+          <a:noFill/>
+          <a:ln/>
+        </p:spPr>
+        <p:txBody>
+          <a:bodyPr/>
+          <a:lstStyle/>
+          <a:p>
+            <a:pPr eaLnBrk="1" hangingPunct="1"/>
+            <a:endParaRPr lang="en-US" smtClean="0"/>
+          </a:p>
+        </p:txBody>
+      </p:sp>
+    </p:spTree>
+  </p:cSld>
+  <p:clrMapOvr>
+    <a:masterClrMapping/>
+  </p:clrMapOvr>
+</p:notes>
+</file>
+
 <file path=ppt/notesSlides/notesSlide2.xml><?xml version="1.0" encoding="utf-8"?>
 <p:notes xmlns:a="http://schemas.openxmlformats.org/drawingml/2006/main" xmlns:r="http://schemas.openxmlformats.org/officeDocument/2006/relationships" xmlns:p="http://schemas.openxmlformats.org/presentationml/2006/main">
   <p:cSld>
@@ -1990,6 +2085,9 @@
   <p:clrMapOvr>
     <a:masterClrMapping/>
   </p:clrMapOvr>
+  <p:transition xmlns:p14="http://schemas.microsoft.com/office/powerpoint/2010/main" spd="slow" advClick="0">
+    <p:fade/>
+  </p:transition>
 </p:sldLayout>
 </file>
 
@@ -2162,6 +2260,9 @@
   <p:clrMapOvr>
     <a:masterClrMapping/>
   </p:clrMapOvr>
+  <p:transition xmlns:p14="http://schemas.microsoft.com/office/powerpoint/2010/main" spd="slow" advClick="0">
+    <p:fade/>
+  </p:transition>
 </p:sldLayout>
 </file>
 
@@ -2255,6 +2356,9 @@
   <p:clrMapOvr>
     <a:masterClrMapping/>
   </p:clrMapOvr>
+  <p:transition xmlns:p14="http://schemas.microsoft.com/office/powerpoint/2010/main" spd="slow" advClick="0">
+    <p:fade/>
+  </p:transition>
 </p:sldLayout>
 </file>
 
@@ -2321,6 +2425,9 @@
   <p:clrMapOvr>
     <a:masterClrMapping/>
   </p:clrMapOvr>
+  <p:transition xmlns:p14="http://schemas.microsoft.com/office/powerpoint/2010/main" spd="slow" advClick="0">
+    <p:fade/>
+  </p:transition>
 </p:sldLayout>
 </file>
 
@@ -2607,22 +2714,7 @@
                 <a:uFillTx/>
                 <a:latin typeface="Comic Sans MS" pitchFamily="66" charset="0"/>
               </a:rPr>
-              <a:t>Albert R Meyer           May </a:t>
-            </a:r>
-            <a:r>
-              <a:rPr kumimoji="0" lang="en-US" sz="1200" b="0" i="0" u="none" strike="noStrike" kern="1200" cap="none" spc="0" normalizeH="0" baseline="0" noProof="0" dirty="0" smtClean="0">
-                <a:ln>
-                  <a:noFill/>
-                </a:ln>
-                <a:solidFill>
-                  <a:schemeClr val="tx1"/>
-                </a:solidFill>
-                <a:effectLst/>
-                <a:uLnTx/>
-                <a:uFillTx/>
-                <a:latin typeface="Comic Sans MS" pitchFamily="66" charset="0"/>
-              </a:rPr>
-              <a:t>6, 2013</a:t>
+              <a:t>Albert R Meyer           May 6, 2013</a:t>
             </a:r>
             <a:endParaRPr kumimoji="0" lang="en-US" sz="1200" b="0" i="0" u="none" strike="noStrike" kern="1200" cap="none" spc="0" normalizeH="0" baseline="0" noProof="0" dirty="0">
               <a:ln>
@@ -2672,6 +2764,9 @@
     <p:sldLayoutId id="2147483809" r:id="rId3"/>
     <p:sldLayoutId id="2147483810" r:id="rId4"/>
   </p:sldLayoutIdLst>
+  <p:transition xmlns:p14="http://schemas.microsoft.com/office/powerpoint/2010/main" spd="slow" advClick="0">
+    <p:fade/>
+  </p:transition>
   <p:timing>
     <p:tnLst>
       <p:par>
@@ -3231,9 +3326,14 @@
   <p:clrMapOvr>
     <a:masterClrMapping/>
   </p:clrMapOvr>
-  <p:transition xmlns:p14="http://schemas.microsoft.com/office/powerpoint/2010/main">
-    <p:fade/>
-  </p:transition>
+  <mc:AlternateContent xmlns:mc="http://schemas.openxmlformats.org/markup-compatibility/2006">
+    <mc:Choice xmlns:p14="http://schemas.microsoft.com/office/powerpoint/2010/main" Requires="p14">
+      <p:transition p14:dur="0" advClick="0"/>
+    </mc:Choice>
+    <mc:Fallback>
+      <p:transition xmlns:p14="http://schemas.microsoft.com/office/powerpoint/2010/main" advClick="0"/>
+    </mc:Fallback>
+  </mc:AlternateContent>
   <p:timing>
     <p:tnLst>
       <p:par>
@@ -3487,7 +3587,7 @@
           <a:graphicData uri="http://schemas.openxmlformats.org/presentationml/2006/ole">
             <mc:AlternateContent xmlns:mc="http://schemas.openxmlformats.org/markup-compatibility/2006">
               <mc:Choice xmlns:v="urn:schemas-microsoft-com:vml" Requires="v">
-                <p:oleObj spid="_x0000_s484390" name="Equation" r:id="rId4" imgW="2133600" imgH="533400" progId="Equation.DSMT4">
+                <p:oleObj spid="_x0000_s484397" name="Equation" r:id="rId4" imgW="2133600" imgH="533400" progId="Equation.DSMT4">
                   <p:embed/>
                 </p:oleObj>
               </mc:Choice>
@@ -3574,8 +3674,8 @@
   <p:clrMapOvr>
     <a:masterClrMapping/>
   </p:clrMapOvr>
-  <p:transition xmlns:p14="http://schemas.microsoft.com/office/powerpoint/2010/main" spd="slow">
-    <p:fade thruBlk="1"/>
+  <p:transition xmlns:p14="http://schemas.microsoft.com/office/powerpoint/2010/main" spd="slow" advClick="0">
+    <p:fade/>
   </p:transition>
   <p:timing>
     <p:tnLst>
@@ -3819,6 +3919,1604 @@
 </p:sld>
 </file>
 
+<file path=ppt/slides/slide11.xml><?xml version="1.0" encoding="utf-8"?>
+<p:sld xmlns:a="http://schemas.openxmlformats.org/drawingml/2006/main" xmlns:r="http://schemas.openxmlformats.org/officeDocument/2006/relationships" xmlns:p="http://schemas.openxmlformats.org/presentationml/2006/main">
+  <p:cSld>
+    <p:spTree>
+      <p:nvGrpSpPr>
+        <p:cNvPr id="1" name=""/>
+        <p:cNvGrpSpPr/>
+        <p:nvPr/>
+      </p:nvGrpSpPr>
+      <p:grpSpPr>
+        <a:xfrm>
+          <a:off x="0" y="0"/>
+          <a:ext cx="0" cy="0"/>
+          <a:chOff x="0" y="0"/>
+          <a:chExt cx="0" cy="0"/>
+        </a:xfrm>
+      </p:grpSpPr>
+      <p:sp>
+        <p:nvSpPr>
+          <p:cNvPr id="6" name="Slide Number Placeholder 3"/>
+          <p:cNvSpPr>
+            <a:spLocks noGrp="1"/>
+          </p:cNvSpPr>
+          <p:nvPr>
+            <p:ph type="sldNum" sz="quarter" idx="11"/>
+          </p:nvPr>
+        </p:nvSpPr>
+        <p:spPr/>
+        <p:txBody>
+          <a:bodyPr/>
+          <a:lstStyle/>
+          <a:p>
+            <a:pPr>
+              <a:defRPr/>
+            </a:pPr>
+            <a:r>
+              <a:rPr lang="en-US" dirty="0" err="1" smtClean="0"/>
+              <a:t>ranvarindep</a:t>
+            </a:r>
+            <a:r>
+              <a:rPr lang="en-US" dirty="0" smtClean="0"/>
+              <a:t>.</a:t>
+            </a:r>
+            <a:fld id="{95F672D9-7FDA-4DF5-84B2-B60196FF4FEA}" type="slidenum">
+              <a:rPr lang="en-US" smtClean="0"/>
+              <a:pPr>
+                <a:defRPr/>
+              </a:pPr>
+              <a:t>11</a:t>
+            </a:fld>
+            <a:endParaRPr lang="en-US" dirty="0"/>
+          </a:p>
+        </p:txBody>
+      </p:sp>
+      <p:sp>
+        <p:nvSpPr>
+          <p:cNvPr id="32772" name="Rectangle 3"/>
+          <p:cNvSpPr>
+            <a:spLocks noGrp="1" noChangeArrowheads="1"/>
+          </p:cNvSpPr>
+          <p:nvPr>
+            <p:ph idx="4294967295"/>
+          </p:nvPr>
+        </p:nvSpPr>
+        <p:spPr>
+          <a:xfrm>
+            <a:off x="568391" y="1143761"/>
+            <a:ext cx="7953310" cy="4609339"/>
+          </a:xfrm>
+        </p:spPr>
+        <p:txBody>
+          <a:bodyPr/>
+          <a:lstStyle/>
+          <a:p>
+            <a:pPr eaLnBrk="1" hangingPunct="1"/>
+            <a:r>
+              <a:rPr lang="en-US" sz="6000" dirty="0" smtClean="0">
+                <a:solidFill>
+                  <a:srgbClr val="0000FF"/>
+                </a:solidFill>
+              </a:rPr>
+              <a:t>O </a:t>
+            </a:r>
+            <a:r>
+              <a:rPr lang="en-US" sz="6000" dirty="0" smtClean="0"/>
+              <a:t>::= odd #Heads</a:t>
+            </a:r>
+            <a:r>
+              <a:rPr lang="en-US" sz="6000" dirty="0" smtClean="0">
+                <a:solidFill>
+                  <a:srgbClr val="0000FF"/>
+                </a:solidFill>
+              </a:rPr>
+              <a:t>  </a:t>
+            </a:r>
+            <a:r>
+              <a:rPr lang="en-US" sz="6000" dirty="0" smtClean="0"/>
+              <a:t>  </a:t>
+            </a:r>
+          </a:p>
+          <a:p>
+            <a:pPr eaLnBrk="1" hangingPunct="1"/>
+            <a:r>
+              <a:rPr lang="en-US" sz="6000" dirty="0" smtClean="0"/>
+              <a:t>Are </a:t>
+            </a:r>
+            <a:r>
+              <a:rPr lang="en-US" sz="6000" dirty="0" smtClean="0">
+                <a:solidFill>
+                  <a:srgbClr val="3333FF"/>
+                </a:solidFill>
+              </a:rPr>
+              <a:t>M</a:t>
+            </a:r>
+            <a:r>
+              <a:rPr lang="en-US" sz="6000" dirty="0" smtClean="0"/>
+              <a:t> </a:t>
+            </a:r>
+            <a:r>
+              <a:rPr lang="en-US" sz="6000" dirty="0" smtClean="0"/>
+              <a:t>and </a:t>
+            </a:r>
+            <a:r>
+              <a:rPr lang="en-US" sz="6000" dirty="0" smtClean="0">
+                <a:solidFill>
+                  <a:srgbClr val="0000FF"/>
+                </a:solidFill>
+              </a:rPr>
+              <a:t>I</a:t>
+            </a:r>
+            <a:r>
+              <a:rPr lang="en-US" sz="6000" baseline="-25000" dirty="0" smtClean="0">
+                <a:solidFill>
+                  <a:srgbClr val="0000FF"/>
+                </a:solidFill>
+              </a:rPr>
+              <a:t>O</a:t>
+            </a:r>
+            <a:endParaRPr lang="en-US" sz="6000" baseline="-25000" dirty="0" smtClean="0">
+              <a:solidFill>
+                <a:srgbClr val="0000FF"/>
+              </a:solidFill>
+            </a:endParaRPr>
+          </a:p>
+          <a:p>
+            <a:pPr eaLnBrk="1" hangingPunct="1"/>
+            <a:r>
+              <a:rPr lang="en-US" sz="6000" dirty="0" smtClean="0"/>
+              <a:t>    </a:t>
+            </a:r>
+            <a:r>
+              <a:rPr lang="en-US" sz="6000" dirty="0" smtClean="0"/>
+              <a:t>independent?</a:t>
+            </a:r>
+          </a:p>
+        </p:txBody>
+      </p:sp>
+      <p:sp>
+        <p:nvSpPr>
+          <p:cNvPr id="8" name="Rectangle 2"/>
+          <p:cNvSpPr txBox="1">
+            <a:spLocks noChangeArrowheads="1"/>
+          </p:cNvSpPr>
+          <p:nvPr/>
+        </p:nvSpPr>
+        <p:spPr bwMode="auto">
+          <a:xfrm>
+            <a:off x="1143000" y="58738"/>
+            <a:ext cx="7543800" cy="1143000"/>
+          </a:xfrm>
+          <a:prstGeom prst="rect">
+            <a:avLst/>
+          </a:prstGeom>
+          <a:noFill/>
+          <a:ln w="9525">
+            <a:noFill/>
+            <a:miter lim="800000"/>
+            <a:headEnd/>
+            <a:tailEnd/>
+          </a:ln>
+        </p:spPr>
+        <p:txBody>
+          <a:bodyPr vert="horz" wrap="square" lIns="91440" tIns="45720" rIns="91440" bIns="45720" numCol="1" anchor="ctr" anchorCtr="0" compatLnSpc="1">
+            <a:prstTxWarp prst="textNoShape">
+              <a:avLst/>
+            </a:prstTxWarp>
+          </a:bodyPr>
+          <a:lstStyle/>
+          <a:p>
+            <a:pPr marL="0" marR="0" lvl="0" indent="0" algn="ctr" defTabSz="914400" rtl="0" eaLnBrk="1" fontAlgn="base" latinLnBrk="0" hangingPunct="1">
+              <a:lnSpc>
+                <a:spcPct val="100000"/>
+              </a:lnSpc>
+              <a:spcBef>
+                <a:spcPct val="0"/>
+              </a:spcBef>
+              <a:spcAft>
+                <a:spcPct val="0"/>
+              </a:spcAft>
+              <a:buClrTx/>
+              <a:buSzTx/>
+              <a:buFontTx/>
+              <a:buNone/>
+              <a:tabLst/>
+              <a:defRPr/>
+            </a:pPr>
+            <a:r>
+              <a:rPr kumimoji="0" lang="en-US" sz="4000" b="1" i="0" u="none" strike="noStrike" kern="0" cap="none" spc="0" normalizeH="0" baseline="0" noProof="0" smtClean="0">
+                <a:ln>
+                  <a:noFill/>
+                </a:ln>
+                <a:solidFill>
+                  <a:schemeClr val="tx2"/>
+                </a:solidFill>
+                <a:effectLst/>
+                <a:uLnTx/>
+                <a:uFillTx/>
+                <a:latin typeface="+mj-lt"/>
+                <a:ea typeface="+mj-ea"/>
+                <a:cs typeface="+mj-cs"/>
+              </a:rPr>
+              <a:t>Independent Variables</a:t>
+            </a:r>
+            <a:endParaRPr kumimoji="0" lang="en-US" sz="4000" b="1" i="0" u="none" strike="noStrike" kern="0" cap="none" spc="0" normalizeH="0" baseline="0" noProof="0" dirty="0" smtClean="0">
+              <a:ln>
+                <a:noFill/>
+              </a:ln>
+              <a:solidFill>
+                <a:schemeClr val="tx2"/>
+              </a:solidFill>
+              <a:effectLst/>
+              <a:uLnTx/>
+              <a:uFillTx/>
+              <a:latin typeface="+mj-lt"/>
+              <a:ea typeface="+mj-ea"/>
+              <a:cs typeface="+mj-cs"/>
+            </a:endParaRPr>
+          </a:p>
+        </p:txBody>
+      </p:sp>
+      <p:sp>
+        <p:nvSpPr>
+          <p:cNvPr id="5" name="TextBox 4"/>
+          <p:cNvSpPr txBox="1"/>
+          <p:nvPr/>
+        </p:nvSpPr>
+        <p:spPr>
+          <a:xfrm>
+            <a:off x="6594051" y="3239316"/>
+            <a:ext cx="1837763" cy="1107996"/>
+          </a:xfrm>
+          <a:prstGeom prst="rect">
+            <a:avLst/>
+          </a:prstGeom>
+          <a:noFill/>
+        </p:spPr>
+        <p:txBody>
+          <a:bodyPr wrap="none" rtlCol="0">
+            <a:spAutoFit/>
+          </a:bodyPr>
+          <a:lstStyle/>
+          <a:p>
+            <a:r>
+              <a:rPr lang="en-US" sz="6600" dirty="0" smtClean="0">
+                <a:solidFill>
+                  <a:srgbClr val="008000"/>
+                </a:solidFill>
+                <a:latin typeface="+mj-lt"/>
+              </a:rPr>
+              <a:t>YES</a:t>
+            </a:r>
+          </a:p>
+        </p:txBody>
+      </p:sp>
+      <p:sp>
+        <p:nvSpPr>
+          <p:cNvPr id="2" name="TextBox 1"/>
+          <p:cNvSpPr txBox="1"/>
+          <p:nvPr/>
+        </p:nvSpPr>
+        <p:spPr>
+          <a:xfrm>
+            <a:off x="1211627" y="4470400"/>
+            <a:ext cx="6773509" cy="1323439"/>
+          </a:xfrm>
+          <a:prstGeom prst="rect">
+            <a:avLst/>
+          </a:prstGeom>
+          <a:noFill/>
+        </p:spPr>
+        <p:txBody>
+          <a:bodyPr wrap="none" rtlCol="0">
+            <a:spAutoFit/>
+          </a:bodyPr>
+          <a:lstStyle/>
+          <a:p>
+            <a:r>
+              <a:rPr lang="en-US" sz="8000" dirty="0" smtClean="0">
+                <a:latin typeface="Comic Sans MS"/>
+                <a:cs typeface="Comic Sans MS"/>
+              </a:rPr>
+              <a:t>(Work it out!)</a:t>
+            </a:r>
+            <a:endParaRPr lang="en-US" sz="8000" dirty="0">
+              <a:latin typeface="Comic Sans MS"/>
+              <a:cs typeface="Comic Sans MS"/>
+            </a:endParaRPr>
+          </a:p>
+        </p:txBody>
+      </p:sp>
+    </p:spTree>
+    <p:extLst>
+      <p:ext uri="{BB962C8B-B14F-4D97-AF65-F5344CB8AC3E}">
+        <p14:creationId xmlns:p14="http://schemas.microsoft.com/office/powerpoint/2010/main" val="3181645826"/>
+      </p:ext>
+    </p:extLst>
+  </p:cSld>
+  <p:clrMapOvr>
+    <a:masterClrMapping/>
+  </p:clrMapOvr>
+  <p:transition xmlns:p14="http://schemas.microsoft.com/office/powerpoint/2010/main" spd="slow" advClick="0">
+    <p:fade/>
+  </p:transition>
+  <p:timing>
+    <p:tnLst>
+      <p:par>
+        <p:cTn xmlns:p14="http://schemas.microsoft.com/office/powerpoint/2010/main" id="1" dur="indefinite" restart="never" nodeType="tmRoot">
+          <p:childTnLst>
+            <p:seq concurrent="1" nextAc="seek">
+              <p:cTn id="2" dur="indefinite" nodeType="mainSeq">
+                <p:childTnLst>
+                  <p:par>
+                    <p:cTn id="3" fill="hold">
+                      <p:stCondLst>
+                        <p:cond delay="indefinite"/>
+                      </p:stCondLst>
+                      <p:childTnLst>
+                        <p:par>
+                          <p:cTn id="4" fill="hold">
+                            <p:stCondLst>
+                              <p:cond delay="0"/>
+                            </p:stCondLst>
+                            <p:childTnLst>
+                              <p:par>
+                                <p:cTn id="5" presetID="10" presetClass="entr" presetSubtype="0" fill="hold" grpId="0" nodeType="clickEffect">
+                                  <p:stCondLst>
+                                    <p:cond delay="0"/>
+                                  </p:stCondLst>
+                                  <p:childTnLst>
+                                    <p:set>
+                                      <p:cBhvr>
+                                        <p:cTn id="6" dur="1" fill="hold">
+                                          <p:stCondLst>
+                                            <p:cond delay="0"/>
+                                          </p:stCondLst>
+                                        </p:cTn>
+                                        <p:tgtEl>
+                                          <p:spTgt spid="32772">
+                                            <p:txEl>
+                                              <p:pRg st="0" end="0"/>
+                                            </p:txEl>
+                                          </p:spTgt>
+                                        </p:tgtEl>
+                                        <p:attrNameLst>
+                                          <p:attrName>style.visibility</p:attrName>
+                                        </p:attrNameLst>
+                                      </p:cBhvr>
+                                      <p:to>
+                                        <p:strVal val="visible"/>
+                                      </p:to>
+                                    </p:set>
+                                    <p:animEffect transition="in" filter="fade">
+                                      <p:cBhvr>
+                                        <p:cTn id="7" dur="500"/>
+                                        <p:tgtEl>
+                                          <p:spTgt spid="32772">
+                                            <p:txEl>
+                                              <p:pRg st="0" end="0"/>
+                                            </p:txEl>
+                                          </p:spTgt>
+                                        </p:tgtEl>
+                                      </p:cBhvr>
+                                    </p:animEffect>
+                                  </p:childTnLst>
+                                </p:cTn>
+                              </p:par>
+                            </p:childTnLst>
+                          </p:cTn>
+                        </p:par>
+                      </p:childTnLst>
+                    </p:cTn>
+                  </p:par>
+                  <p:par>
+                    <p:cTn id="8" fill="hold">
+                      <p:stCondLst>
+                        <p:cond delay="indefinite"/>
+                      </p:stCondLst>
+                      <p:childTnLst>
+                        <p:par>
+                          <p:cTn id="9" fill="hold">
+                            <p:stCondLst>
+                              <p:cond delay="0"/>
+                            </p:stCondLst>
+                            <p:childTnLst>
+                              <p:par>
+                                <p:cTn id="10" presetID="10" presetClass="entr" presetSubtype="0" fill="hold" grpId="0" nodeType="clickEffect">
+                                  <p:stCondLst>
+                                    <p:cond delay="0"/>
+                                  </p:stCondLst>
+                                  <p:childTnLst>
+                                    <p:set>
+                                      <p:cBhvr>
+                                        <p:cTn id="11" dur="1" fill="hold">
+                                          <p:stCondLst>
+                                            <p:cond delay="0"/>
+                                          </p:stCondLst>
+                                        </p:cTn>
+                                        <p:tgtEl>
+                                          <p:spTgt spid="32772">
+                                            <p:txEl>
+                                              <p:pRg st="1" end="1"/>
+                                            </p:txEl>
+                                          </p:spTgt>
+                                        </p:tgtEl>
+                                        <p:attrNameLst>
+                                          <p:attrName>style.visibility</p:attrName>
+                                        </p:attrNameLst>
+                                      </p:cBhvr>
+                                      <p:to>
+                                        <p:strVal val="visible"/>
+                                      </p:to>
+                                    </p:set>
+                                    <p:animEffect transition="in" filter="fade">
+                                      <p:cBhvr>
+                                        <p:cTn id="12" dur="500"/>
+                                        <p:tgtEl>
+                                          <p:spTgt spid="32772">
+                                            <p:txEl>
+                                              <p:pRg st="1" end="1"/>
+                                            </p:txEl>
+                                          </p:spTgt>
+                                        </p:tgtEl>
+                                      </p:cBhvr>
+                                    </p:animEffect>
+                                  </p:childTnLst>
+                                </p:cTn>
+                              </p:par>
+                              <p:par>
+                                <p:cTn id="13" presetID="10" presetClass="entr" presetSubtype="0" fill="hold" grpId="0" nodeType="withEffect">
+                                  <p:stCondLst>
+                                    <p:cond delay="0"/>
+                                  </p:stCondLst>
+                                  <p:childTnLst>
+                                    <p:set>
+                                      <p:cBhvr>
+                                        <p:cTn id="14" dur="1" fill="hold">
+                                          <p:stCondLst>
+                                            <p:cond delay="0"/>
+                                          </p:stCondLst>
+                                        </p:cTn>
+                                        <p:tgtEl>
+                                          <p:spTgt spid="32772">
+                                            <p:txEl>
+                                              <p:pRg st="2" end="2"/>
+                                            </p:txEl>
+                                          </p:spTgt>
+                                        </p:tgtEl>
+                                        <p:attrNameLst>
+                                          <p:attrName>style.visibility</p:attrName>
+                                        </p:attrNameLst>
+                                      </p:cBhvr>
+                                      <p:to>
+                                        <p:strVal val="visible"/>
+                                      </p:to>
+                                    </p:set>
+                                    <p:animEffect transition="in" filter="fade">
+                                      <p:cBhvr>
+                                        <p:cTn id="15" dur="500"/>
+                                        <p:tgtEl>
+                                          <p:spTgt spid="32772">
+                                            <p:txEl>
+                                              <p:pRg st="2" end="2"/>
+                                            </p:txEl>
+                                          </p:spTgt>
+                                        </p:tgtEl>
+                                      </p:cBhvr>
+                                    </p:animEffect>
+                                  </p:childTnLst>
+                                </p:cTn>
+                              </p:par>
+                            </p:childTnLst>
+                          </p:cTn>
+                        </p:par>
+                      </p:childTnLst>
+                    </p:cTn>
+                  </p:par>
+                  <p:par>
+                    <p:cTn id="16" fill="hold">
+                      <p:stCondLst>
+                        <p:cond delay="indefinite"/>
+                      </p:stCondLst>
+                      <p:childTnLst>
+                        <p:par>
+                          <p:cTn id="17" fill="hold">
+                            <p:stCondLst>
+                              <p:cond delay="0"/>
+                            </p:stCondLst>
+                            <p:childTnLst>
+                              <p:par>
+                                <p:cTn id="18" presetID="10" presetClass="entr" presetSubtype="0" fill="hold" grpId="0" nodeType="clickEffect">
+                                  <p:stCondLst>
+                                    <p:cond delay="0"/>
+                                  </p:stCondLst>
+                                  <p:childTnLst>
+                                    <p:set>
+                                      <p:cBhvr>
+                                        <p:cTn id="19" dur="1" fill="hold">
+                                          <p:stCondLst>
+                                            <p:cond delay="0"/>
+                                          </p:stCondLst>
+                                        </p:cTn>
+                                        <p:tgtEl>
+                                          <p:spTgt spid="5">
+                                            <p:txEl>
+                                              <p:pRg st="0" end="0"/>
+                                            </p:txEl>
+                                          </p:spTgt>
+                                        </p:tgtEl>
+                                        <p:attrNameLst>
+                                          <p:attrName>style.visibility</p:attrName>
+                                        </p:attrNameLst>
+                                      </p:cBhvr>
+                                      <p:to>
+                                        <p:strVal val="visible"/>
+                                      </p:to>
+                                    </p:set>
+                                    <p:animEffect transition="in" filter="fade">
+                                      <p:cBhvr>
+                                        <p:cTn id="20" dur="500"/>
+                                        <p:tgtEl>
+                                          <p:spTgt spid="5">
+                                            <p:txEl>
+                                              <p:pRg st="0" end="0"/>
+                                            </p:txEl>
+                                          </p:spTgt>
+                                        </p:tgtEl>
+                                      </p:cBhvr>
+                                    </p:animEffect>
+                                  </p:childTnLst>
+                                </p:cTn>
+                              </p:par>
+                            </p:childTnLst>
+                          </p:cTn>
+                        </p:par>
+                      </p:childTnLst>
+                    </p:cTn>
+                  </p:par>
+                  <p:par>
+                    <p:cTn id="21" fill="hold">
+                      <p:stCondLst>
+                        <p:cond delay="indefinite"/>
+                      </p:stCondLst>
+                      <p:childTnLst>
+                        <p:par>
+                          <p:cTn id="22" fill="hold">
+                            <p:stCondLst>
+                              <p:cond delay="0"/>
+                            </p:stCondLst>
+                            <p:childTnLst>
+                              <p:par>
+                                <p:cTn id="23" presetID="10" presetClass="entr" presetSubtype="0" fill="hold" grpId="0" nodeType="clickEffect">
+                                  <p:stCondLst>
+                                    <p:cond delay="0"/>
+                                  </p:stCondLst>
+                                  <p:childTnLst>
+                                    <p:set>
+                                      <p:cBhvr>
+                                        <p:cTn id="24" dur="1" fill="hold">
+                                          <p:stCondLst>
+                                            <p:cond delay="0"/>
+                                          </p:stCondLst>
+                                        </p:cTn>
+                                        <p:tgtEl>
+                                          <p:spTgt spid="2"/>
+                                        </p:tgtEl>
+                                        <p:attrNameLst>
+                                          <p:attrName>style.visibility</p:attrName>
+                                        </p:attrNameLst>
+                                      </p:cBhvr>
+                                      <p:to>
+                                        <p:strVal val="visible"/>
+                                      </p:to>
+                                    </p:set>
+                                    <p:animEffect transition="in" filter="fade">
+                                      <p:cBhvr>
+                                        <p:cTn id="25" dur="500"/>
+                                        <p:tgtEl>
+                                          <p:spTgt spid="2"/>
+                                        </p:tgtEl>
+                                      </p:cBhvr>
+                                    </p:animEffect>
+                                  </p:childTnLst>
+                                </p:cTn>
+                              </p:par>
+                            </p:childTnLst>
+                          </p:cTn>
+                        </p:par>
+                      </p:childTnLst>
+                    </p:cTn>
+                  </p:par>
+                </p:childTnLst>
+              </p:cTn>
+              <p:prevCondLst>
+                <p:cond evt="onPrev" delay="0">
+                  <p:tgtEl>
+                    <p:sldTgt/>
+                  </p:tgtEl>
+                </p:cond>
+              </p:prevCondLst>
+              <p:nextCondLst>
+                <p:cond evt="onNext" delay="0">
+                  <p:tgtEl>
+                    <p:sldTgt/>
+                  </p:tgtEl>
+                </p:cond>
+              </p:nextCondLst>
+            </p:seq>
+          </p:childTnLst>
+        </p:cTn>
+      </p:par>
+    </p:tnLst>
+    <p:bldLst>
+      <p:bldP spid="32772" grpId="0" build="p"/>
+      <p:bldP spid="5" grpId="0" build="p"/>
+      <p:bldP spid="2" grpId="0"/>
+    </p:bldLst>
+  </p:timing>
+</p:sld>
+</file>
+
+<file path=ppt/slides/slide12.xml><?xml version="1.0" encoding="utf-8"?>
+<p:sld xmlns:a="http://schemas.openxmlformats.org/drawingml/2006/main" xmlns:r="http://schemas.openxmlformats.org/officeDocument/2006/relationships" xmlns:p="http://schemas.openxmlformats.org/presentationml/2006/main">
+  <p:cSld>
+    <p:spTree>
+      <p:nvGrpSpPr>
+        <p:cNvPr id="1" name=""/>
+        <p:cNvGrpSpPr/>
+        <p:nvPr/>
+      </p:nvGrpSpPr>
+      <p:grpSpPr>
+        <a:xfrm>
+          <a:off x="0" y="0"/>
+          <a:ext cx="0" cy="0"/>
+          <a:chOff x="0" y="0"/>
+          <a:chExt cx="0" cy="0"/>
+        </a:xfrm>
+      </p:grpSpPr>
+      <p:sp>
+        <p:nvSpPr>
+          <p:cNvPr id="2" name="Slide Number Placeholder 1"/>
+          <p:cNvSpPr>
+            <a:spLocks noGrp="1"/>
+          </p:cNvSpPr>
+          <p:nvPr>
+            <p:ph type="sldNum" sz="quarter" idx="11"/>
+          </p:nvPr>
+        </p:nvSpPr>
+        <p:spPr/>
+        <p:txBody>
+          <a:bodyPr/>
+          <a:lstStyle/>
+          <a:p>
+            <a:pPr>
+              <a:defRPr/>
+            </a:pPr>
+            <a:r>
+              <a:rPr lang="en-US" smtClean="0"/>
+              <a:t>ranvarindep.</a:t>
+            </a:r>
+            <a:fld id="{4E62291C-8AD8-4AE0-8F6D-A8437E91FB33}" type="slidenum">
+              <a:rPr lang="en-US" smtClean="0"/>
+              <a:pPr>
+                <a:defRPr/>
+              </a:pPr>
+              <a:t>12</a:t>
+            </a:fld>
+            <a:endParaRPr lang="en-US" dirty="0"/>
+          </a:p>
+        </p:txBody>
+      </p:sp>
+      <p:sp>
+        <p:nvSpPr>
+          <p:cNvPr id="3" name="Rectangle 2"/>
+          <p:cNvSpPr txBox="1">
+            <a:spLocks noChangeArrowheads="1"/>
+          </p:cNvSpPr>
+          <p:nvPr/>
+        </p:nvSpPr>
+        <p:spPr bwMode="auto">
+          <a:xfrm>
+            <a:off x="1143000" y="58738"/>
+            <a:ext cx="7543800" cy="1143000"/>
+          </a:xfrm>
+          <a:prstGeom prst="rect">
+            <a:avLst/>
+          </a:prstGeom>
+          <a:noFill/>
+          <a:ln w="9525">
+            <a:noFill/>
+            <a:miter lim="800000"/>
+            <a:headEnd/>
+            <a:tailEnd/>
+          </a:ln>
+        </p:spPr>
+        <p:txBody>
+          <a:bodyPr vert="horz" wrap="square" lIns="91440" tIns="45720" rIns="91440" bIns="45720" numCol="1" anchor="ctr" anchorCtr="0" compatLnSpc="1">
+            <a:prstTxWarp prst="textNoShape">
+              <a:avLst/>
+            </a:prstTxWarp>
+          </a:bodyPr>
+          <a:lstStyle/>
+          <a:p>
+            <a:pPr marL="0" marR="0" lvl="0" indent="0" algn="ctr" defTabSz="914400" rtl="0" eaLnBrk="1" fontAlgn="base" latinLnBrk="0" hangingPunct="1">
+              <a:lnSpc>
+                <a:spcPct val="100000"/>
+              </a:lnSpc>
+              <a:spcBef>
+                <a:spcPct val="0"/>
+              </a:spcBef>
+              <a:spcAft>
+                <a:spcPct val="0"/>
+              </a:spcAft>
+              <a:buClrTx/>
+              <a:buSzTx/>
+              <a:buFontTx/>
+              <a:buNone/>
+              <a:tabLst/>
+              <a:defRPr/>
+            </a:pPr>
+            <a:r>
+              <a:rPr kumimoji="0" lang="en-US" sz="4000" b="1" i="0" u="none" strike="noStrike" kern="0" cap="none" spc="0" normalizeH="0" baseline="0" noProof="0" smtClean="0">
+                <a:ln>
+                  <a:noFill/>
+                </a:ln>
+                <a:solidFill>
+                  <a:schemeClr val="tx2"/>
+                </a:solidFill>
+                <a:effectLst/>
+                <a:uLnTx/>
+                <a:uFillTx/>
+                <a:latin typeface="+mj-lt"/>
+                <a:ea typeface="+mj-ea"/>
+                <a:cs typeface="+mj-cs"/>
+              </a:rPr>
+              <a:t>Independent Variables</a:t>
+            </a:r>
+            <a:endParaRPr kumimoji="0" lang="en-US" sz="4000" b="1" i="0" u="none" strike="noStrike" kern="0" cap="none" spc="0" normalizeH="0" baseline="0" noProof="0" dirty="0" smtClean="0">
+              <a:ln>
+                <a:noFill/>
+              </a:ln>
+              <a:solidFill>
+                <a:schemeClr val="tx2"/>
+              </a:solidFill>
+              <a:effectLst/>
+              <a:uLnTx/>
+              <a:uFillTx/>
+              <a:latin typeface="+mj-lt"/>
+              <a:ea typeface="+mj-ea"/>
+              <a:cs typeface="+mj-cs"/>
+            </a:endParaRPr>
+          </a:p>
+        </p:txBody>
+      </p:sp>
+      <p:sp>
+        <p:nvSpPr>
+          <p:cNvPr id="4" name="TextBox 3"/>
+          <p:cNvSpPr txBox="1"/>
+          <p:nvPr/>
+        </p:nvSpPr>
+        <p:spPr>
+          <a:xfrm>
+            <a:off x="467734" y="1714500"/>
+            <a:ext cx="8233932" cy="3416320"/>
+          </a:xfrm>
+          <a:prstGeom prst="rect">
+            <a:avLst/>
+          </a:prstGeom>
+          <a:noFill/>
+        </p:spPr>
+        <p:txBody>
+          <a:bodyPr wrap="none" rtlCol="0">
+            <a:spAutoFit/>
+          </a:bodyPr>
+          <a:lstStyle/>
+          <a:p>
+            <a:pPr lvl="0"/>
+            <a:r>
+              <a:rPr lang="en-US" sz="4400" dirty="0">
+                <a:solidFill>
+                  <a:srgbClr val="9B2894"/>
+                </a:solidFill>
+                <a:latin typeface="Comic Sans MS"/>
+                <a:cs typeface="Comic Sans MS"/>
+              </a:rPr>
+              <a:t>Lemma</a:t>
+            </a:r>
+            <a:r>
+              <a:rPr lang="en-US" sz="4400" dirty="0" smtClean="0">
+                <a:solidFill>
+                  <a:srgbClr val="9B2894"/>
+                </a:solidFill>
+                <a:latin typeface="Comic Sans MS"/>
+                <a:cs typeface="Comic Sans MS"/>
+              </a:rPr>
+              <a:t>:</a:t>
+            </a:r>
+            <a:endParaRPr lang="en-US" sz="5400" dirty="0" smtClean="0">
+              <a:latin typeface="Comic Sans MS"/>
+              <a:cs typeface="Comic Sans MS"/>
+            </a:endParaRPr>
+          </a:p>
+          <a:p>
+            <a:r>
+              <a:rPr lang="en-US" sz="5400" dirty="0" smtClean="0">
+                <a:latin typeface="Comic Sans MS"/>
+                <a:cs typeface="Comic Sans MS"/>
+              </a:rPr>
+              <a:t>If </a:t>
+            </a:r>
+            <a:r>
+              <a:rPr lang="en-US" sz="5400" dirty="0" smtClean="0">
+                <a:solidFill>
+                  <a:srgbClr val="0000FF"/>
+                </a:solidFill>
+                <a:latin typeface="Comic Sans MS"/>
+                <a:cs typeface="Comic Sans MS"/>
+              </a:rPr>
+              <a:t>R</a:t>
+            </a:r>
+            <a:r>
+              <a:rPr lang="en-US" sz="5400" dirty="0" smtClean="0">
+                <a:latin typeface="Comic Sans MS"/>
+                <a:cs typeface="Comic Sans MS"/>
+              </a:rPr>
+              <a:t> is independent of </a:t>
+            </a:r>
+            <a:r>
+              <a:rPr lang="en-US" sz="5400" dirty="0" smtClean="0">
+                <a:solidFill>
+                  <a:srgbClr val="0000FF"/>
+                </a:solidFill>
+                <a:latin typeface="Comic Sans MS"/>
+                <a:cs typeface="Comic Sans MS"/>
+              </a:rPr>
+              <a:t>S</a:t>
+            </a:r>
+            <a:r>
+              <a:rPr lang="en-US" sz="5400" dirty="0" smtClean="0">
+                <a:latin typeface="Comic Sans MS"/>
+                <a:cs typeface="Comic Sans MS"/>
+              </a:rPr>
+              <a:t>,</a:t>
+            </a:r>
+          </a:p>
+          <a:p>
+            <a:r>
+              <a:rPr lang="en-US" sz="5400" dirty="0" smtClean="0">
+                <a:latin typeface="Comic Sans MS"/>
+                <a:cs typeface="Comic Sans MS"/>
+              </a:rPr>
+              <a:t>then </a:t>
+            </a:r>
+            <a:r>
+              <a:rPr lang="en-US" sz="5400" dirty="0" smtClean="0">
+                <a:solidFill>
+                  <a:srgbClr val="3333FF"/>
+                </a:solidFill>
+                <a:latin typeface="Comic Sans MS"/>
+                <a:cs typeface="Comic Sans MS"/>
+              </a:rPr>
+              <a:t>R</a:t>
+            </a:r>
+            <a:r>
+              <a:rPr lang="en-US" sz="5400" dirty="0" smtClean="0">
+                <a:latin typeface="Comic Sans MS"/>
+                <a:cs typeface="Comic Sans MS"/>
+              </a:rPr>
+              <a:t> is independent of</a:t>
+            </a:r>
+          </a:p>
+          <a:p>
+            <a:r>
+              <a:rPr lang="en-US" sz="5400" dirty="0" smtClean="0">
+                <a:solidFill>
+                  <a:srgbClr val="FF00FF"/>
+                </a:solidFill>
+                <a:latin typeface="Comic Sans MS"/>
+                <a:cs typeface="Comic Sans MS"/>
+              </a:rPr>
+              <a:t>any information</a:t>
+            </a:r>
+            <a:r>
+              <a:rPr lang="en-US" sz="5400" dirty="0" smtClean="0">
+                <a:latin typeface="Comic Sans MS"/>
+                <a:cs typeface="Comic Sans MS"/>
+              </a:rPr>
+              <a:t> about </a:t>
+            </a:r>
+            <a:r>
+              <a:rPr lang="en-US" sz="5400" dirty="0" smtClean="0">
+                <a:solidFill>
+                  <a:srgbClr val="3333FF"/>
+                </a:solidFill>
+                <a:latin typeface="Comic Sans MS"/>
+                <a:cs typeface="Comic Sans MS"/>
+              </a:rPr>
+              <a:t>S.</a:t>
+            </a:r>
+          </a:p>
+        </p:txBody>
+      </p:sp>
+    </p:spTree>
+    <p:extLst>
+      <p:ext uri="{BB962C8B-B14F-4D97-AF65-F5344CB8AC3E}">
+        <p14:creationId xmlns:p14="http://schemas.microsoft.com/office/powerpoint/2010/main" val="1421773915"/>
+      </p:ext>
+    </p:extLst>
+  </p:cSld>
+  <p:clrMapOvr>
+    <a:masterClrMapping/>
+  </p:clrMapOvr>
+  <mc:AlternateContent xmlns:mc="http://schemas.openxmlformats.org/markup-compatibility/2006">
+    <mc:Choice xmlns:p14="http://schemas.microsoft.com/office/powerpoint/2010/main" Requires="p14">
+      <p:transition spd="slow" p14:dur="1100" advClick="0">
+        <p:fade thruBlk="1"/>
+      </p:transition>
+    </mc:Choice>
+    <mc:Fallback>
+      <p:transition xmlns:p14="http://schemas.microsoft.com/office/powerpoint/2010/main" spd="slow" advClick="0">
+        <p:fade thruBlk="1"/>
+      </p:transition>
+    </mc:Fallback>
+  </mc:AlternateContent>
+  <p:timing>
+    <p:tnLst>
+      <p:par>
+        <p:cTn xmlns:p14="http://schemas.microsoft.com/office/powerpoint/2010/main" id="1" dur="indefinite" restart="never" nodeType="tmRoot">
+          <p:childTnLst>
+            <p:seq concurrent="1" nextAc="seek">
+              <p:cTn id="2" dur="indefinite" nodeType="mainSeq">
+                <p:childTnLst>
+                  <p:par>
+                    <p:cTn id="3" fill="hold">
+                      <p:stCondLst>
+                        <p:cond delay="indefinite"/>
+                      </p:stCondLst>
+                      <p:childTnLst>
+                        <p:par>
+                          <p:cTn id="4" fill="hold">
+                            <p:stCondLst>
+                              <p:cond delay="0"/>
+                            </p:stCondLst>
+                            <p:childTnLst>
+                              <p:par>
+                                <p:cTn id="5" presetID="10" presetClass="entr" presetSubtype="0" fill="hold" grpId="0" nodeType="clickEffect">
+                                  <p:stCondLst>
+                                    <p:cond delay="0"/>
+                                  </p:stCondLst>
+                                  <p:childTnLst>
+                                    <p:set>
+                                      <p:cBhvr>
+                                        <p:cTn id="6" dur="1" fill="hold">
+                                          <p:stCondLst>
+                                            <p:cond delay="0"/>
+                                          </p:stCondLst>
+                                        </p:cTn>
+                                        <p:tgtEl>
+                                          <p:spTgt spid="4">
+                                            <p:txEl>
+                                              <p:pRg st="1" end="1"/>
+                                            </p:txEl>
+                                          </p:spTgt>
+                                        </p:tgtEl>
+                                        <p:attrNameLst>
+                                          <p:attrName>style.visibility</p:attrName>
+                                        </p:attrNameLst>
+                                      </p:cBhvr>
+                                      <p:to>
+                                        <p:strVal val="visible"/>
+                                      </p:to>
+                                    </p:set>
+                                    <p:animEffect transition="in" filter="fade">
+                                      <p:cBhvr>
+                                        <p:cTn id="7" dur="500"/>
+                                        <p:tgtEl>
+                                          <p:spTgt spid="4">
+                                            <p:txEl>
+                                              <p:pRg st="1" end="1"/>
+                                            </p:txEl>
+                                          </p:spTgt>
+                                        </p:tgtEl>
+                                      </p:cBhvr>
+                                    </p:animEffect>
+                                  </p:childTnLst>
+                                </p:cTn>
+                              </p:par>
+                            </p:childTnLst>
+                          </p:cTn>
+                        </p:par>
+                      </p:childTnLst>
+                    </p:cTn>
+                  </p:par>
+                  <p:par>
+                    <p:cTn id="8" fill="hold">
+                      <p:stCondLst>
+                        <p:cond delay="indefinite"/>
+                      </p:stCondLst>
+                      <p:childTnLst>
+                        <p:par>
+                          <p:cTn id="9" fill="hold">
+                            <p:stCondLst>
+                              <p:cond delay="0"/>
+                            </p:stCondLst>
+                            <p:childTnLst>
+                              <p:par>
+                                <p:cTn id="10" presetID="10" presetClass="entr" presetSubtype="0" fill="hold" grpId="0" nodeType="clickEffect">
+                                  <p:stCondLst>
+                                    <p:cond delay="0"/>
+                                  </p:stCondLst>
+                                  <p:childTnLst>
+                                    <p:set>
+                                      <p:cBhvr>
+                                        <p:cTn id="11" dur="1" fill="hold">
+                                          <p:stCondLst>
+                                            <p:cond delay="0"/>
+                                          </p:stCondLst>
+                                        </p:cTn>
+                                        <p:tgtEl>
+                                          <p:spTgt spid="4">
+                                            <p:txEl>
+                                              <p:pRg st="2" end="2"/>
+                                            </p:txEl>
+                                          </p:spTgt>
+                                        </p:tgtEl>
+                                        <p:attrNameLst>
+                                          <p:attrName>style.visibility</p:attrName>
+                                        </p:attrNameLst>
+                                      </p:cBhvr>
+                                      <p:to>
+                                        <p:strVal val="visible"/>
+                                      </p:to>
+                                    </p:set>
+                                    <p:animEffect transition="in" filter="fade">
+                                      <p:cBhvr>
+                                        <p:cTn id="12" dur="500"/>
+                                        <p:tgtEl>
+                                          <p:spTgt spid="4">
+                                            <p:txEl>
+                                              <p:pRg st="2" end="2"/>
+                                            </p:txEl>
+                                          </p:spTgt>
+                                        </p:tgtEl>
+                                      </p:cBhvr>
+                                    </p:animEffect>
+                                  </p:childTnLst>
+                                </p:cTn>
+                              </p:par>
+                              <p:par>
+                                <p:cTn id="13" presetID="10" presetClass="entr" presetSubtype="0" fill="hold" grpId="0" nodeType="withEffect">
+                                  <p:stCondLst>
+                                    <p:cond delay="0"/>
+                                  </p:stCondLst>
+                                  <p:childTnLst>
+                                    <p:set>
+                                      <p:cBhvr>
+                                        <p:cTn id="14" dur="1" fill="hold">
+                                          <p:stCondLst>
+                                            <p:cond delay="0"/>
+                                          </p:stCondLst>
+                                        </p:cTn>
+                                        <p:tgtEl>
+                                          <p:spTgt spid="4">
+                                            <p:txEl>
+                                              <p:pRg st="3" end="3"/>
+                                            </p:txEl>
+                                          </p:spTgt>
+                                        </p:tgtEl>
+                                        <p:attrNameLst>
+                                          <p:attrName>style.visibility</p:attrName>
+                                        </p:attrNameLst>
+                                      </p:cBhvr>
+                                      <p:to>
+                                        <p:strVal val="visible"/>
+                                      </p:to>
+                                    </p:set>
+                                    <p:animEffect transition="in" filter="fade">
+                                      <p:cBhvr>
+                                        <p:cTn id="15" dur="500"/>
+                                        <p:tgtEl>
+                                          <p:spTgt spid="4">
+                                            <p:txEl>
+                                              <p:pRg st="3" end="3"/>
+                                            </p:txEl>
+                                          </p:spTgt>
+                                        </p:tgtEl>
+                                      </p:cBhvr>
+                                    </p:animEffect>
+                                  </p:childTnLst>
+                                </p:cTn>
+                              </p:par>
+                            </p:childTnLst>
+                          </p:cTn>
+                        </p:par>
+                      </p:childTnLst>
+                    </p:cTn>
+                  </p:par>
+                </p:childTnLst>
+              </p:cTn>
+              <p:prevCondLst>
+                <p:cond evt="onPrev" delay="0">
+                  <p:tgtEl>
+                    <p:sldTgt/>
+                  </p:tgtEl>
+                </p:cond>
+              </p:prevCondLst>
+              <p:nextCondLst>
+                <p:cond evt="onNext" delay="0">
+                  <p:tgtEl>
+                    <p:sldTgt/>
+                  </p:tgtEl>
+                </p:cond>
+              </p:nextCondLst>
+            </p:seq>
+          </p:childTnLst>
+        </p:cTn>
+      </p:par>
+    </p:tnLst>
+    <p:bldLst>
+      <p:bldP spid="4" grpId="0" build="p"/>
+    </p:bldLst>
+  </p:timing>
+</p:sld>
+</file>
+
+<file path=ppt/slides/slide13.xml><?xml version="1.0" encoding="utf-8"?>
+<p:sld xmlns:a="http://schemas.openxmlformats.org/drawingml/2006/main" xmlns:r="http://schemas.openxmlformats.org/officeDocument/2006/relationships" xmlns:p="http://schemas.openxmlformats.org/presentationml/2006/main">
+  <p:cSld>
+    <p:spTree>
+      <p:nvGrpSpPr>
+        <p:cNvPr id="1" name=""/>
+        <p:cNvGrpSpPr/>
+        <p:nvPr/>
+      </p:nvGrpSpPr>
+      <p:grpSpPr>
+        <a:xfrm>
+          <a:off x="0" y="0"/>
+          <a:ext cx="0" cy="0"/>
+          <a:chOff x="0" y="0"/>
+          <a:chExt cx="0" cy="0"/>
+        </a:xfrm>
+      </p:grpSpPr>
+      <p:sp>
+        <p:nvSpPr>
+          <p:cNvPr id="2" name="Slide Number Placeholder 1"/>
+          <p:cNvSpPr>
+            <a:spLocks noGrp="1"/>
+          </p:cNvSpPr>
+          <p:nvPr>
+            <p:ph type="sldNum" sz="quarter" idx="11"/>
+          </p:nvPr>
+        </p:nvSpPr>
+        <p:spPr/>
+        <p:txBody>
+          <a:bodyPr/>
+          <a:lstStyle/>
+          <a:p>
+            <a:pPr>
+              <a:defRPr/>
+            </a:pPr>
+            <a:r>
+              <a:rPr lang="en-US" smtClean="0"/>
+              <a:t>ranvarindep.</a:t>
+            </a:r>
+            <a:fld id="{4E62291C-8AD8-4AE0-8F6D-A8437E91FB33}" type="slidenum">
+              <a:rPr lang="en-US" smtClean="0"/>
+              <a:pPr>
+                <a:defRPr/>
+              </a:pPr>
+              <a:t>13</a:t>
+            </a:fld>
+            <a:endParaRPr lang="en-US" dirty="0"/>
+          </a:p>
+        </p:txBody>
+      </p:sp>
+      <p:sp>
+        <p:nvSpPr>
+          <p:cNvPr id="3" name="Rectangle 2"/>
+          <p:cNvSpPr txBox="1">
+            <a:spLocks noChangeArrowheads="1"/>
+          </p:cNvSpPr>
+          <p:nvPr/>
+        </p:nvSpPr>
+        <p:spPr bwMode="auto">
+          <a:xfrm>
+            <a:off x="1143000" y="58738"/>
+            <a:ext cx="7543800" cy="1143000"/>
+          </a:xfrm>
+          <a:prstGeom prst="rect">
+            <a:avLst/>
+          </a:prstGeom>
+          <a:noFill/>
+          <a:ln w="9525">
+            <a:noFill/>
+            <a:miter lim="800000"/>
+            <a:headEnd/>
+            <a:tailEnd/>
+          </a:ln>
+        </p:spPr>
+        <p:txBody>
+          <a:bodyPr vert="horz" wrap="square" lIns="91440" tIns="45720" rIns="91440" bIns="45720" numCol="1" anchor="ctr" anchorCtr="0" compatLnSpc="1">
+            <a:prstTxWarp prst="textNoShape">
+              <a:avLst/>
+            </a:prstTxWarp>
+          </a:bodyPr>
+          <a:lstStyle/>
+          <a:p>
+            <a:pPr marL="0" marR="0" lvl="0" indent="0" algn="ctr" defTabSz="914400" rtl="0" eaLnBrk="1" fontAlgn="base" latinLnBrk="0" hangingPunct="1">
+              <a:lnSpc>
+                <a:spcPct val="100000"/>
+              </a:lnSpc>
+              <a:spcBef>
+                <a:spcPct val="0"/>
+              </a:spcBef>
+              <a:spcAft>
+                <a:spcPct val="0"/>
+              </a:spcAft>
+              <a:buClrTx/>
+              <a:buSzTx/>
+              <a:buFontTx/>
+              <a:buNone/>
+              <a:tabLst/>
+              <a:defRPr/>
+            </a:pPr>
+            <a:r>
+              <a:rPr kumimoji="0" lang="en-US" sz="4000" b="1" i="0" u="none" strike="noStrike" kern="0" cap="none" spc="0" normalizeH="0" baseline="0" noProof="0" smtClean="0">
+                <a:ln>
+                  <a:noFill/>
+                </a:ln>
+                <a:solidFill>
+                  <a:schemeClr val="tx2"/>
+                </a:solidFill>
+                <a:effectLst/>
+                <a:uLnTx/>
+                <a:uFillTx/>
+                <a:latin typeface="+mj-lt"/>
+                <a:ea typeface="+mj-ea"/>
+                <a:cs typeface="+mj-cs"/>
+              </a:rPr>
+              <a:t>Independent Variables</a:t>
+            </a:r>
+            <a:endParaRPr kumimoji="0" lang="en-US" sz="4000" b="1" i="0" u="none" strike="noStrike" kern="0" cap="none" spc="0" normalizeH="0" baseline="0" noProof="0" dirty="0" smtClean="0">
+              <a:ln>
+                <a:noFill/>
+              </a:ln>
+              <a:solidFill>
+                <a:schemeClr val="tx2"/>
+              </a:solidFill>
+              <a:effectLst/>
+              <a:uLnTx/>
+              <a:uFillTx/>
+              <a:latin typeface="+mj-lt"/>
+              <a:ea typeface="+mj-ea"/>
+              <a:cs typeface="+mj-cs"/>
+            </a:endParaRPr>
+          </a:p>
+        </p:txBody>
+      </p:sp>
+      <p:sp>
+        <p:nvSpPr>
+          <p:cNvPr id="4" name="TextBox 3"/>
+          <p:cNvSpPr txBox="1"/>
+          <p:nvPr/>
+        </p:nvSpPr>
+        <p:spPr>
+          <a:xfrm>
+            <a:off x="467734" y="1714500"/>
+            <a:ext cx="8233932" cy="3416320"/>
+          </a:xfrm>
+          <a:prstGeom prst="rect">
+            <a:avLst/>
+          </a:prstGeom>
+          <a:noFill/>
+        </p:spPr>
+        <p:txBody>
+          <a:bodyPr wrap="none" rtlCol="0">
+            <a:spAutoFit/>
+          </a:bodyPr>
+          <a:lstStyle/>
+          <a:p>
+            <a:pPr lvl="0"/>
+            <a:r>
+              <a:rPr lang="en-US" sz="4400" dirty="0">
+                <a:solidFill>
+                  <a:srgbClr val="9B2894"/>
+                </a:solidFill>
+                <a:latin typeface="Comic Sans MS"/>
+                <a:cs typeface="Comic Sans MS"/>
+              </a:rPr>
+              <a:t>Lemma</a:t>
+            </a:r>
+            <a:r>
+              <a:rPr lang="en-US" sz="4400" dirty="0" smtClean="0">
+                <a:solidFill>
+                  <a:srgbClr val="9B2894"/>
+                </a:solidFill>
+                <a:latin typeface="Comic Sans MS"/>
+                <a:cs typeface="Comic Sans MS"/>
+              </a:rPr>
+              <a:t>:</a:t>
+            </a:r>
+            <a:endParaRPr lang="en-US" sz="5400" dirty="0" smtClean="0">
+              <a:latin typeface="Comic Sans MS"/>
+              <a:cs typeface="Comic Sans MS"/>
+            </a:endParaRPr>
+          </a:p>
+          <a:p>
+            <a:r>
+              <a:rPr lang="en-US" sz="5400" dirty="0" smtClean="0">
+                <a:latin typeface="Comic Sans MS"/>
+                <a:cs typeface="Comic Sans MS"/>
+              </a:rPr>
+              <a:t>If </a:t>
+            </a:r>
+            <a:r>
+              <a:rPr lang="en-US" sz="5400" dirty="0" smtClean="0">
+                <a:solidFill>
+                  <a:srgbClr val="0000FF"/>
+                </a:solidFill>
+                <a:latin typeface="Comic Sans MS"/>
+                <a:cs typeface="Comic Sans MS"/>
+              </a:rPr>
+              <a:t>R</a:t>
+            </a:r>
+            <a:r>
+              <a:rPr lang="en-US" sz="5400" dirty="0" smtClean="0">
+                <a:latin typeface="Comic Sans MS"/>
+                <a:cs typeface="Comic Sans MS"/>
+              </a:rPr>
+              <a:t> is independent of </a:t>
+            </a:r>
+            <a:r>
+              <a:rPr lang="en-US" sz="5400" dirty="0" smtClean="0">
+                <a:solidFill>
+                  <a:srgbClr val="0000FF"/>
+                </a:solidFill>
+                <a:latin typeface="Comic Sans MS"/>
+                <a:cs typeface="Comic Sans MS"/>
+              </a:rPr>
+              <a:t>S</a:t>
+            </a:r>
+            <a:r>
+              <a:rPr lang="en-US" sz="5400" dirty="0" smtClean="0">
+                <a:latin typeface="Comic Sans MS"/>
+                <a:cs typeface="Comic Sans MS"/>
+              </a:rPr>
+              <a:t>,</a:t>
+            </a:r>
+          </a:p>
+          <a:p>
+            <a:r>
+              <a:rPr lang="en-US" sz="5400" dirty="0" smtClean="0">
+                <a:latin typeface="Comic Sans MS"/>
+                <a:cs typeface="Comic Sans MS"/>
+              </a:rPr>
+              <a:t>and                  , then</a:t>
+            </a:r>
+          </a:p>
+          <a:p>
+            <a:r>
+              <a:rPr lang="en-US" sz="5400" dirty="0">
+                <a:solidFill>
+                  <a:srgbClr val="0000FF"/>
+                </a:solidFill>
+                <a:latin typeface="Comic Sans MS"/>
+                <a:cs typeface="Comic Sans MS"/>
+              </a:rPr>
+              <a:t>R</a:t>
+            </a:r>
+            <a:r>
+              <a:rPr lang="en-US" sz="5400" dirty="0">
+                <a:latin typeface="Comic Sans MS"/>
+                <a:cs typeface="Comic Sans MS"/>
+              </a:rPr>
+              <a:t> is independent of </a:t>
+            </a:r>
+            <a:r>
+              <a:rPr lang="en-US" sz="5400" dirty="0" smtClean="0">
+                <a:solidFill>
+                  <a:srgbClr val="3333FF"/>
+                </a:solidFill>
+                <a:latin typeface="Comic Sans MS"/>
+                <a:cs typeface="Comic Sans MS"/>
+              </a:rPr>
+              <a:t>f(</a:t>
+            </a:r>
+            <a:r>
+              <a:rPr lang="en-US" sz="5400" dirty="0" smtClean="0">
+                <a:solidFill>
+                  <a:srgbClr val="0000FF"/>
+                </a:solidFill>
+                <a:latin typeface="Comic Sans MS"/>
+                <a:cs typeface="Comic Sans MS"/>
+              </a:rPr>
+              <a:t>S)</a:t>
+            </a:r>
+            <a:endParaRPr lang="en-US" sz="5400" dirty="0" smtClean="0">
+              <a:solidFill>
+                <a:srgbClr val="3333FF"/>
+              </a:solidFill>
+              <a:latin typeface="Comic Sans MS"/>
+              <a:cs typeface="Comic Sans MS"/>
+            </a:endParaRPr>
+          </a:p>
+        </p:txBody>
+      </p:sp>
+      <p:graphicFrame>
+        <p:nvGraphicFramePr>
+          <p:cNvPr id="5" name="Object 4"/>
+          <p:cNvGraphicFramePr>
+            <a:graphicFrameLocks noChangeAspect="1"/>
+          </p:cNvGraphicFramePr>
+          <p:nvPr>
+            <p:extLst>
+              <p:ext uri="{D42A27DB-BD31-4B8C-83A1-F6EECF244321}">
+                <p14:modId xmlns:p14="http://schemas.microsoft.com/office/powerpoint/2010/main" val="1855986619"/>
+              </p:ext>
+            </p:extLst>
+          </p:nvPr>
+        </p:nvGraphicFramePr>
+        <p:xfrm>
+          <a:off x="1828799" y="3238500"/>
+          <a:ext cx="3544993" cy="1003300"/>
+        </p:xfrm>
+        <a:graphic>
+          <a:graphicData uri="http://schemas.openxmlformats.org/presentationml/2006/ole">
+            <mc:AlternateContent xmlns:mc="http://schemas.openxmlformats.org/markup-compatibility/2006">
+              <mc:Choice xmlns:v="urn:schemas-microsoft-com:vml" Requires="v">
+                <p:oleObj spid="_x0000_s1028" name="Equation" r:id="rId3" imgW="673100" imgH="190500" progId="Equation.DSMT4">
+                  <p:embed/>
+                </p:oleObj>
+              </mc:Choice>
+              <mc:Fallback>
+                <p:oleObj name="Equation" r:id="rId3" imgW="673100" imgH="190500" progId="Equation.DSMT4">
+                  <p:embed/>
+                  <p:pic>
+                    <p:nvPicPr>
+                      <p:cNvPr id="0" name=""/>
+                      <p:cNvPicPr/>
+                      <p:nvPr/>
+                    </p:nvPicPr>
+                    <p:blipFill>
+                      <a:blip r:embed="rId4"/>
+                      <a:stretch>
+                        <a:fillRect/>
+                      </a:stretch>
+                    </p:blipFill>
+                    <p:spPr>
+                      <a:xfrm>
+                        <a:off x="1828799" y="3238500"/>
+                        <a:ext cx="3544993" cy="1003300"/>
+                      </a:xfrm>
+                      <a:prstGeom prst="rect">
+                        <a:avLst/>
+                      </a:prstGeom>
+                    </p:spPr>
+                  </p:pic>
+                </p:oleObj>
+              </mc:Fallback>
+            </mc:AlternateContent>
+          </a:graphicData>
+        </a:graphic>
+      </p:graphicFrame>
+    </p:spTree>
+    <p:extLst>
+      <p:ext uri="{BB962C8B-B14F-4D97-AF65-F5344CB8AC3E}">
+        <p14:creationId xmlns:p14="http://schemas.microsoft.com/office/powerpoint/2010/main" val="2270588882"/>
+      </p:ext>
+    </p:extLst>
+  </p:cSld>
+  <p:clrMapOvr>
+    <a:masterClrMapping/>
+  </p:clrMapOvr>
+  <mc:AlternateContent xmlns:mc="http://schemas.openxmlformats.org/markup-compatibility/2006">
+    <mc:Choice xmlns:p14="http://schemas.microsoft.com/office/powerpoint/2010/main" Requires="p14">
+      <p:transition spd="med" p14:dur="600" advClick="0">
+        <p:fade/>
+      </p:transition>
+    </mc:Choice>
+    <mc:Fallback>
+      <p:transition xmlns:p14="http://schemas.microsoft.com/office/powerpoint/2010/main" spd="med" advClick="0">
+        <p:fade/>
+      </p:transition>
+    </mc:Fallback>
+  </mc:AlternateContent>
+  <p:timing>
+    <p:tnLst>
+      <p:par>
+        <p:cTn xmlns:p14="http://schemas.microsoft.com/office/powerpoint/2010/main" id="1" dur="indefinite" restart="never" nodeType="tmRoot">
+          <p:childTnLst>
+            <p:seq concurrent="1" nextAc="seek">
+              <p:cTn id="2" dur="indefinite" nodeType="mainSeq">
+                <p:childTnLst>
+                  <p:par>
+                    <p:cTn id="3" fill="hold">
+                      <p:stCondLst>
+                        <p:cond delay="indefinite"/>
+                      </p:stCondLst>
+                      <p:childTnLst>
+                        <p:par>
+                          <p:cTn id="4" fill="hold">
+                            <p:stCondLst>
+                              <p:cond delay="0"/>
+                            </p:stCondLst>
+                            <p:childTnLst>
+                              <p:par>
+                                <p:cTn id="5" presetID="10" presetClass="entr" presetSubtype="0" fill="hold" nodeType="clickEffect">
+                                  <p:stCondLst>
+                                    <p:cond delay="0"/>
+                                  </p:stCondLst>
+                                  <p:childTnLst>
+                                    <p:set>
+                                      <p:cBhvr>
+                                        <p:cTn id="6" dur="1" fill="hold">
+                                          <p:stCondLst>
+                                            <p:cond delay="0"/>
+                                          </p:stCondLst>
+                                        </p:cTn>
+                                        <p:tgtEl>
+                                          <p:spTgt spid="4">
+                                            <p:txEl>
+                                              <p:pRg st="3" end="3"/>
+                                            </p:txEl>
+                                          </p:spTgt>
+                                        </p:tgtEl>
+                                        <p:attrNameLst>
+                                          <p:attrName>style.visibility</p:attrName>
+                                        </p:attrNameLst>
+                                      </p:cBhvr>
+                                      <p:to>
+                                        <p:strVal val="visible"/>
+                                      </p:to>
+                                    </p:set>
+                                    <p:animEffect transition="in" filter="fade">
+                                      <p:cBhvr>
+                                        <p:cTn id="7" dur="500"/>
+                                        <p:tgtEl>
+                                          <p:spTgt spid="4">
+                                            <p:txEl>
+                                              <p:pRg st="3" end="3"/>
+                                            </p:txEl>
+                                          </p:spTgt>
+                                        </p:tgtEl>
+                                      </p:cBhvr>
+                                    </p:animEffect>
+                                  </p:childTnLst>
+                                </p:cTn>
+                              </p:par>
+                            </p:childTnLst>
+                          </p:cTn>
+                        </p:par>
+                      </p:childTnLst>
+                    </p:cTn>
+                  </p:par>
+                </p:childTnLst>
+              </p:cTn>
+              <p:prevCondLst>
+                <p:cond evt="onPrev" delay="0">
+                  <p:tgtEl>
+                    <p:sldTgt/>
+                  </p:tgtEl>
+                </p:cond>
+              </p:prevCondLst>
+              <p:nextCondLst>
+                <p:cond evt="onNext" delay="0">
+                  <p:tgtEl>
+                    <p:sldTgt/>
+                  </p:tgtEl>
+                </p:cond>
+              </p:nextCondLst>
+            </p:seq>
+          </p:childTnLst>
+        </p:cTn>
+      </p:par>
+    </p:tnLst>
+  </p:timing>
+</p:sld>
+</file>
+
 <file path=ppt/slides/slide2.xml><?xml version="1.0" encoding="utf-8"?>
 <p:sld xmlns:a="http://schemas.openxmlformats.org/drawingml/2006/main" xmlns:r="http://schemas.openxmlformats.org/officeDocument/2006/relationships" xmlns:p="http://schemas.openxmlformats.org/presentationml/2006/main">
   <p:cSld>
@@ -4018,7 +5716,7 @@
   <p:clrMapOvr>
     <a:masterClrMapping/>
   </p:clrMapOvr>
-  <p:transition xmlns:p14="http://schemas.microsoft.com/office/powerpoint/2010/main" spd="slow">
+  <p:transition xmlns:p14="http://schemas.microsoft.com/office/powerpoint/2010/main" spd="slow" advClick="0">
     <p:fade thruBlk="1"/>
   </p:transition>
   <p:timing>
@@ -4450,7 +6148,7 @@
   <p:clrMapOvr>
     <a:masterClrMapping/>
   </p:clrMapOvr>
-  <p:transition xmlns:p14="http://schemas.microsoft.com/office/powerpoint/2010/main" spd="med">
+  <p:transition xmlns:p14="http://schemas.microsoft.com/office/powerpoint/2010/main" spd="slow" advClick="0">
     <p:fade/>
   </p:transition>
   <p:timing>
@@ -4737,14 +6435,22 @@
           <a:p>
             <a:pPr eaLnBrk="1" hangingPunct="1"/>
             <a:r>
-              <a:rPr lang="en-US" smtClean="0"/>
-              <a:t>Example: Flip three fair coins</a:t>
+              <a:rPr lang="en-US" sz="3600" dirty="0" smtClean="0">
+                <a:solidFill>
+                  <a:srgbClr val="9B2894"/>
+                </a:solidFill>
+              </a:rPr>
+              <a:t>Example:</a:t>
+            </a:r>
+            <a:r>
+              <a:rPr lang="en-US" dirty="0" smtClean="0"/>
+              <a:t> Flip three fair coins</a:t>
             </a:r>
           </a:p>
           <a:p>
             <a:pPr algn="ctr" eaLnBrk="1" hangingPunct="1"/>
             <a:r>
-              <a:rPr lang="en-US" sz="6000" smtClean="0">
+              <a:rPr lang="en-US" sz="6000" dirty="0" smtClean="0">
                 <a:solidFill>
                   <a:srgbClr val="3333FF"/>
                 </a:solidFill>
@@ -4752,7 +6458,7 @@
               <a:t>C</a:t>
             </a:r>
             <a:r>
-              <a:rPr lang="en-US" sz="6000" i="1" smtClean="0">
+              <a:rPr lang="en-US" sz="6000" i="1" dirty="0" smtClean="0">
                 <a:solidFill>
                   <a:schemeClr val="accent2"/>
                 </a:solidFill>
@@ -4760,19 +6466,19 @@
               <a:t> </a:t>
             </a:r>
             <a:r>
-              <a:rPr lang="en-US" sz="6000" smtClean="0"/>
+              <a:rPr lang="en-US" sz="6000" dirty="0" smtClean="0"/>
               <a:t>::=</a:t>
             </a:r>
             <a:r>
-              <a:rPr lang="en-US" sz="6000" i="1" smtClean="0"/>
+              <a:rPr lang="en-US" sz="6000" i="1" dirty="0" smtClean="0"/>
               <a:t> </a:t>
             </a:r>
             <a:r>
-              <a:rPr lang="en-US" sz="6000" smtClean="0"/>
+              <a:rPr lang="en-US" sz="6000" dirty="0" smtClean="0"/>
               <a:t># heads (</a:t>
             </a:r>
             <a:r>
-              <a:rPr lang="en-US" sz="6000" b="1" smtClean="0">
+              <a:rPr lang="en-US" sz="6000" b="1" dirty="0" smtClean="0">
                 <a:solidFill>
                   <a:srgbClr val="3333FF"/>
                 </a:solidFill>
@@ -4780,7 +6486,7 @@
               <a:t>C</a:t>
             </a:r>
             <a:r>
-              <a:rPr lang="en-US" sz="6000" smtClean="0"/>
+              <a:rPr lang="en-US" sz="6000" dirty="0" smtClean="0"/>
               <a:t>ount)</a:t>
             </a:r>
           </a:p>
@@ -4802,7 +6508,7 @@
           <a:graphicData uri="http://schemas.openxmlformats.org/presentationml/2006/ole">
             <mc:AlternateContent xmlns:mc="http://schemas.openxmlformats.org/markup-compatibility/2006">
               <mc:Choice xmlns:v="urn:schemas-microsoft-com:vml" Requires="v">
-                <p:oleObj spid="_x0000_s6182" name="Equation" r:id="rId4" imgW="1638000" imgH="507960" progId="Equation.DSMT4">
+                <p:oleObj spid="_x0000_s6189" name="Equation" r:id="rId4" imgW="1638000" imgH="507960" progId="Equation.DSMT4">
                   <p:embed/>
                 </p:oleObj>
               </mc:Choice>
@@ -4861,7 +6567,7 @@
   <p:clrMapOvr>
     <a:masterClrMapping/>
   </p:clrMapOvr>
-  <p:transition xmlns:p14="http://schemas.microsoft.com/office/powerpoint/2010/main" spd="slow">
+  <p:transition xmlns:p14="http://schemas.microsoft.com/office/powerpoint/2010/main" spd="slow" advClick="0">
     <p:fade thruBlk="1"/>
   </p:transition>
   <p:timing>
@@ -4885,7 +6591,7 @@
                             </p:stCondLst>
                             <p:childTnLst>
                               <p:par>
-                                <p:cTn id="5" presetID="1" presetClass="entr" presetSubtype="0" fill="hold" nodeType="clickEffect">
+                                <p:cTn id="5" presetID="22" presetClass="entr" presetSubtype="8" fill="hold" nodeType="clickEffect">
                                   <p:stCondLst>
                                     <p:cond delay="0"/>
                                   </p:stCondLst>
@@ -4912,6 +6618,18 @@
                                         <p:strVal val="visible"/>
                                       </p:to>
                                     </p:set>
+                                    <p:animEffect transition="in" filter="wipe(left)">
+                                      <p:cBhvr>
+                                        <p:cTn id="7" dur="1000"/>
+                                        <p:tgtEl>
+                                          <p:spTgt spid="142339">
+                                            <p:txEl>
+                                              <p:pRg st="1" end="1"/>
+                                            </p:txEl>
+                                          </p:spTgt>
+                                        </p:tgtEl>
+                                      </p:cBhvr>
+                                    </p:animEffect>
                                   </p:childTnLst>
                                 </p:cTn>
                               </p:par>
@@ -4922,26 +6640,26 @@
                     </p:cTn>
                   </p:par>
                   <p:par>
-                    <p:cTn id="7" fill="hold">
+                    <p:cTn id="8" fill="hold">
                       <p:stCondLst>
                         <p:cond delay="indefinite"/>
                       </p:stCondLst>
                       <p:childTnLst>
                         <p:par>
-                          <p:cTn id="8" fill="hold">
+                          <p:cTn id="9" fill="hold">
                             <p:stCondLst>
                               <p:cond delay="0"/>
                             </p:stCondLst>
                             <p:childTnLst>
                               <p:par>
-                                <p:cTn id="9" presetID="1" presetClass="entr" presetSubtype="0" fill="hold" nodeType="clickEffect">
+                                <p:cTn id="10" presetID="22" presetClass="entr" presetSubtype="8" fill="hold" nodeType="clickEffect">
                                   <p:stCondLst>
                                     <p:cond delay="0"/>
                                   </p:stCondLst>
                                   <p:childTnLst>
                                     <p:set>
                                       <p:cBhvr>
-                                        <p:cTn id="10" dur="1" fill="hold">
+                                        <p:cTn id="11" dur="1" fill="hold">
                                           <p:stCondLst>
                                             <p:cond delay="0"/>
                                           </p:stCondLst>
@@ -4957,6 +6675,14 @@
                                         <p:strVal val="visible"/>
                                       </p:to>
                                     </p:set>
+                                    <p:animEffect transition="in" filter="wipe(left)">
+                                      <p:cBhvr>
+                                        <p:cTn id="12" dur="1000"/>
+                                        <p:tgtEl>
+                                          <p:spTgt spid="142340"/>
+                                        </p:tgtEl>
+                                      </p:cBhvr>
+                                    </p:animEffect>
                                   </p:childTnLst>
                                 </p:cTn>
                               </p:par>
@@ -5190,19 +6916,7 @@
               <a:rPr lang="en-US" sz="4000" dirty="0" smtClean="0">
                 <a:cs typeface="Times New Roman" pitchFamily="18" charset="0"/>
               </a:rPr>
-              <a:t> </a:t>
-            </a:r>
-            <a:r>
-              <a:rPr lang="en-US" sz="4000" dirty="0" smtClean="0">
-                <a:cs typeface="Times New Roman" pitchFamily="18" charset="0"/>
-              </a:rPr>
-              <a:t>1] </a:t>
-            </a:r>
-            <a:r>
-              <a:rPr lang="en-US" sz="4000" dirty="0" smtClean="0">
-                <a:cs typeface="Times New Roman" pitchFamily="18" charset="0"/>
-              </a:rPr>
-              <a:t>= 7/8</a:t>
+              <a:t> 1] = 7/8</a:t>
             </a:r>
           </a:p>
           <a:p>
@@ -5262,19 +6976,7 @@
               <a:rPr lang="en-US" sz="4000" dirty="0" smtClean="0">
                 <a:cs typeface="Times New Roman" pitchFamily="18" charset="0"/>
               </a:rPr>
-              <a:t> </a:t>
-            </a:r>
-            <a:r>
-              <a:rPr lang="en-US" sz="4000" dirty="0" smtClean="0">
-                <a:cs typeface="Times New Roman" pitchFamily="18" charset="0"/>
-              </a:rPr>
-              <a:t>0] </a:t>
-            </a:r>
-            <a:r>
-              <a:rPr lang="en-US" sz="4000" dirty="0" smtClean="0">
-                <a:cs typeface="Times New Roman" pitchFamily="18" charset="0"/>
-              </a:rPr>
-              <a:t>= </a:t>
+              <a:t> 0] = </a:t>
             </a:r>
             <a:r>
               <a:rPr lang="en-US" sz="4000" dirty="0" err="1" smtClean="0">
@@ -5347,9 +7049,6 @@
               </a:rPr>
               <a:t>0]</a:t>
             </a:r>
-            <a:endParaRPr lang="en-US" sz="4000" dirty="0" smtClean="0">
-              <a:cs typeface="Times New Roman" pitchFamily="18" charset="0"/>
-            </a:endParaRPr>
           </a:p>
           <a:p>
             <a:pPr lvl="1" eaLnBrk="1" hangingPunct="1"/>
@@ -5369,13 +7068,7 @@
               <a:rPr lang="en-US" sz="4000" dirty="0" smtClean="0">
                 <a:cs typeface="Times New Roman" pitchFamily="18" charset="0"/>
               </a:rPr>
-              <a:t>[all heads] </a:t>
-            </a:r>
-            <a:r>
-              <a:rPr lang="en-US" sz="4000" dirty="0" smtClean="0">
-                <a:cs typeface="Times New Roman" pitchFamily="18" charset="0"/>
-              </a:rPr>
-              <a:t>= 1/8</a:t>
+              <a:t>[all heads] = 1/8</a:t>
             </a:r>
           </a:p>
         </p:txBody>
@@ -5385,7 +7078,7 @@
   <p:clrMapOvr>
     <a:masterClrMapping/>
   </p:clrMapOvr>
-  <p:transition xmlns:p14="http://schemas.microsoft.com/office/powerpoint/2010/main" spd="slow">
+  <p:transition xmlns:p14="http://schemas.microsoft.com/office/powerpoint/2010/main" spd="slow" advClick="0">
     <p:fade/>
   </p:transition>
   <p:timing>
@@ -6138,9 +7831,18 @@
   <p:clrMapOvr>
     <a:masterClrMapping/>
   </p:clrMapOvr>
-  <p:transition xmlns:p14="http://schemas.microsoft.com/office/powerpoint/2010/main">
-    <p:fade/>
-  </p:transition>
+  <mc:AlternateContent xmlns:mc="http://schemas.openxmlformats.org/markup-compatibility/2006">
+    <mc:Choice xmlns:p14="http://schemas.microsoft.com/office/powerpoint/2010/main" Requires="p14">
+      <p:transition spd="slow" p14:dur="1200" advClick="0">
+        <p:fade thruBlk="1"/>
+      </p:transition>
+    </mc:Choice>
+    <mc:Fallback>
+      <p:transition xmlns:p14="http://schemas.microsoft.com/office/powerpoint/2010/main" spd="slow" advClick="0">
+        <p:fade thruBlk="1"/>
+      </p:transition>
+    </mc:Fallback>
+  </mc:AlternateContent>
   <p:timing>
     <p:tnLst>
       <p:par>
@@ -6654,9 +8356,18 @@
   <p:clrMapOvr>
     <a:masterClrMapping/>
   </p:clrMapOvr>
-  <p:transition xmlns:p14="http://schemas.microsoft.com/office/powerpoint/2010/main" spd="slow">
-    <p:fade thruBlk="1"/>
-  </p:transition>
+  <mc:AlternateContent xmlns:mc="http://schemas.openxmlformats.org/markup-compatibility/2006">
+    <mc:Choice xmlns:p14="http://schemas.microsoft.com/office/powerpoint/2010/main" Requires="p14">
+      <p:transition spd="slow" p14:dur="900" advClick="0">
+        <p:fade thruBlk="1"/>
+      </p:transition>
+    </mc:Choice>
+    <mc:Fallback>
+      <p:transition xmlns:p14="http://schemas.microsoft.com/office/powerpoint/2010/main" spd="slow" advClick="0">
+        <p:fade thruBlk="1"/>
+      </p:transition>
+    </mc:Fallback>
+  </mc:AlternateContent>
   <p:timing>
     <p:tnLst>
       <p:par>
@@ -6693,7 +8404,7 @@
                                         <p:tgtEl>
                                           <p:spTgt spid="2">
                                             <p:txEl>
-                                              <p:pRg st="0" end="0"/>
+                                              <p:pRg st="2" end="2"/>
                                             </p:txEl>
                                           </p:spTgt>
                                         </p:tgtEl>
@@ -6711,7 +8422,7 @@
                                         <p:tgtEl>
                                           <p:spTgt spid="2">
                                             <p:txEl>
-                                              <p:pRg st="0" end="0"/>
+                                              <p:pRg st="2" end="2"/>
                                             </p:txEl>
                                           </p:spTgt>
                                         </p:tgtEl>
@@ -6736,7 +8447,7 @@
                                         <p:tgtEl>
                                           <p:spTgt spid="2">
                                             <p:txEl>
-                                              <p:pRg st="1" end="1"/>
+                                              <p:pRg st="3" end="3"/>
                                             </p:txEl>
                                           </p:spTgt>
                                         </p:tgtEl>
@@ -6754,110 +8465,6 @@
                                         <p:tgtEl>
                                           <p:spTgt spid="2">
                                             <p:txEl>
-                                              <p:pRg st="1" end="1"/>
-                                            </p:txEl>
-                                          </p:spTgt>
-                                        </p:tgtEl>
-                                      </p:cBhvr>
-                                    </p:animEffect>
-                                  </p:childTnLst>
-                                </p:cTn>
-                              </p:par>
-                            </p:childTnLst>
-                          </p:cTn>
-                        </p:par>
-                      </p:childTnLst>
-                    </p:cTn>
-                  </p:par>
-                  <p:par>
-                    <p:cTn id="11" fill="hold">
-                      <p:stCondLst>
-                        <p:cond delay="indefinite"/>
-                      </p:stCondLst>
-                      <p:childTnLst>
-                        <p:par>
-                          <p:cTn id="12" fill="hold">
-                            <p:stCondLst>
-                              <p:cond delay="0"/>
-                            </p:stCondLst>
-                            <p:childTnLst>
-                              <p:par>
-                                <p:cTn id="13" presetID="9" presetClass="entr" presetSubtype="0" fill="hold" nodeType="clickEffect">
-                                  <p:stCondLst>
-                                    <p:cond delay="0"/>
-                                  </p:stCondLst>
-                                  <p:childTnLst>
-                                    <p:set>
-                                      <p:cBhvr>
-                                        <p:cTn id="14" dur="1" fill="hold">
-                                          <p:stCondLst>
-                                            <p:cond delay="0"/>
-                                          </p:stCondLst>
-                                        </p:cTn>
-                                        <p:tgtEl>
-                                          <p:spTgt spid="2">
-                                            <p:txEl>
-                                              <p:pRg st="2" end="2"/>
-                                            </p:txEl>
-                                          </p:spTgt>
-                                        </p:tgtEl>
-                                        <p:attrNameLst>
-                                          <p:attrName>style.visibility</p:attrName>
-                                        </p:attrNameLst>
-                                      </p:cBhvr>
-                                      <p:to>
-                                        <p:strVal val="visible"/>
-                                      </p:to>
-                                    </p:set>
-                                    <p:animEffect transition="in" filter="dissolve">
-                                      <p:cBhvr>
-                                        <p:cTn id="15" dur="500"/>
-                                        <p:tgtEl>
-                                          <p:spTgt spid="2">
-                                            <p:txEl>
-                                              <p:pRg st="2" end="2"/>
-                                            </p:txEl>
-                                          </p:spTgt>
-                                        </p:tgtEl>
-                                      </p:cBhvr>
-                                    </p:animEffect>
-                                  </p:childTnLst>
-                                </p:cTn>
-                              </p:par>
-                              <p:par>
-                                <p:cTn id="16" presetID="9" presetClass="entr" presetSubtype="0" fill="hold" nodeType="withEffect">
-                                  <p:stCondLst>
-                                    <p:cond delay="0"/>
-                                  </p:stCondLst>
-                                  <p:childTnLst>
-                                    <p:set>
-                                      <p:cBhvr>
-                                        <p:cTn id="17" dur="1" fill="hold">
-                                          <p:stCondLst>
-                                            <p:cond delay="0"/>
-                                          </p:stCondLst>
-                                        </p:cTn>
-                                        <p:tgtEl>
-                                          <p:spTgt spid="2">
-                                            <p:txEl>
-                                              <p:pRg st="3" end="3"/>
-                                            </p:txEl>
-                                          </p:spTgt>
-                                        </p:tgtEl>
-                                        <p:attrNameLst>
-                                          <p:attrName>style.visibility</p:attrName>
-                                        </p:attrNameLst>
-                                      </p:cBhvr>
-                                      <p:to>
-                                        <p:strVal val="visible"/>
-                                      </p:to>
-                                    </p:set>
-                                    <p:animEffect transition="in" filter="dissolve">
-                                      <p:cBhvr>
-                                        <p:cTn id="18" dur="500"/>
-                                        <p:tgtEl>
-                                          <p:spTgt spid="2">
-                                            <p:txEl>
                                               <p:pRg st="3" end="3"/>
                                             </p:txEl>
                                           </p:spTgt>
@@ -6868,14 +8475,14 @@
                                 </p:cTn>
                               </p:par>
                               <p:par>
-                                <p:cTn id="19" presetID="9" presetClass="entr" presetSubtype="0" fill="hold" nodeType="withEffect">
+                                <p:cTn id="11" presetID="9" presetClass="entr" presetSubtype="0" fill="hold" nodeType="withEffect">
                                   <p:stCondLst>
                                     <p:cond delay="0"/>
                                   </p:stCondLst>
                                   <p:childTnLst>
                                     <p:set>
                                       <p:cBhvr>
-                                        <p:cTn id="20" dur="1" fill="hold">
+                                        <p:cTn id="12" dur="1" fill="hold">
                                           <p:stCondLst>
                                             <p:cond delay="0"/>
                                           </p:stCondLst>
@@ -6897,7 +8504,7 @@
                                     </p:set>
                                     <p:animEffect transition="in" filter="dissolve">
                                       <p:cBhvr>
-                                        <p:cTn id="21" dur="500"/>
+                                        <p:cTn id="13" dur="500"/>
                                         <p:tgtEl>
                                           <p:spTgt spid="2">
                                             <p:txEl>
@@ -7148,11 +8755,7 @@
             </a:r>
             <a:r>
               <a:rPr lang="en-US" sz="6000" dirty="0" smtClean="0"/>
-              <a:t>] </a:t>
-            </a:r>
-            <a:r>
-              <a:rPr lang="en-US" sz="6000" dirty="0" smtClean="0"/>
-              <a:t>=</a:t>
+              <a:t>] =</a:t>
             </a:r>
             <a:endParaRPr lang="en-US" sz="6000" dirty="0" smtClean="0">
               <a:solidFill>
@@ -7299,7 +8902,6 @@
               <a:rPr lang="en-US" sz="6000" dirty="0" smtClean="0"/>
               <a:t>]</a:t>
             </a:r>
-            <a:endParaRPr lang="en-US" sz="6000" dirty="0" smtClean="0"/>
           </a:p>
         </p:txBody>
       </p:sp>
@@ -7391,8 +8993,8 @@
   <p:clrMapOvr>
     <a:masterClrMapping/>
   </p:clrMapOvr>
-  <p:transition xmlns:p14="http://schemas.microsoft.com/office/powerpoint/2010/main">
-    <p:fade thruBlk="1"/>
+  <p:transition xmlns:p14="http://schemas.microsoft.com/office/powerpoint/2010/main" spd="slow" advClick="0">
+    <p:fade/>
   </p:transition>
   <p:timing>
     <p:tnLst>
@@ -7641,11 +9243,7 @@
             </a:r>
             <a:r>
               <a:rPr lang="en-US" sz="6000" dirty="0" smtClean="0"/>
-              <a:t>=</a:t>
-            </a:r>
-            <a:r>
-              <a:rPr lang="en-US" sz="6000" dirty="0" smtClean="0"/>
-              <a:t>1]⋅</a:t>
+              <a:t>=1]⋅</a:t>
             </a:r>
             <a:r>
               <a:rPr lang="en-US" sz="6000" dirty="0" err="1" smtClean="0"/>
@@ -7665,11 +9263,7 @@
             </a:r>
             <a:r>
               <a:rPr lang="en-US" sz="6000" dirty="0" smtClean="0"/>
-              <a:t>=</a:t>
-            </a:r>
-            <a:r>
-              <a:rPr lang="en-US" sz="6000" dirty="0" smtClean="0"/>
-              <a:t>1] </a:t>
+              <a:t>=1] </a:t>
             </a:r>
             <a:r>
               <a:rPr lang="en-US" sz="6000" b="1" dirty="0" smtClean="0">
@@ -7726,11 +9320,7 @@
             </a:r>
             <a:r>
               <a:rPr lang="en-US" sz="6000" dirty="0" smtClean="0"/>
-              <a:t>=</a:t>
-            </a:r>
-            <a:r>
-              <a:rPr lang="en-US" sz="6000" dirty="0" smtClean="0"/>
-              <a:t>1] </a:t>
+              <a:t>=1] </a:t>
             </a:r>
             <a:r>
               <a:rPr lang="en-US" sz="6000" b="1" dirty="0" smtClean="0">
@@ -7744,13 +9334,8 @@
             </a:r>
             <a:r>
               <a:rPr lang="en-US" sz="6000" dirty="0" smtClean="0"/>
-              <a:t> </a:t>
-            </a:r>
-            <a:r>
-              <a:rPr lang="en-US" sz="6000" dirty="0" smtClean="0"/>
-              <a:t>0</a:t>
-            </a:r>
-            <a:endParaRPr lang="en-US" sz="6000" dirty="0" smtClean="0"/>
+              <a:t> 0</a:t>
+            </a:r>
           </a:p>
         </p:txBody>
       </p:sp>
@@ -7885,7 +9470,7 @@
   <p:clrMapOvr>
     <a:masterClrMapping/>
   </p:clrMapOvr>
-  <p:transition xmlns:p14="http://schemas.microsoft.com/office/powerpoint/2010/main">
+  <p:transition xmlns:p14="http://schemas.microsoft.com/office/powerpoint/2010/main" spd="slow" advClick="0">
     <p:fade/>
   </p:transition>
   <p:timing>

</xml_diff>